<commit_message>
added tree python implementation
</commit_message>
<xml_diff>
--- a/7 - Tree/Trees.pptx
+++ b/7 - Tree/Trees.pptx
@@ -51558,6 +51558,21 @@
 </file>
 
 <file path=customXml/item1.xml><?xml version="1.0" encoding="utf-8"?>
+<?mso-contentType ?>
+<FormTemplates xmlns="http://schemas.microsoft.com/sharepoint/v3/contenttype/forms">
+  <Display>DocumentLibraryForm</Display>
+  <Edit>DocumentLibraryForm</Edit>
+  <New>DocumentLibraryForm</New>
+</FormTemplates>
+</file>
+
+<file path=customXml/item2.xml><?xml version="1.0" encoding="utf-8"?>
+<p:properties xmlns:p="http://schemas.microsoft.com/office/2006/metadata/properties" xmlns:xsi="http://www.w3.org/2001/XMLSchema-instance" xmlns:pc="http://schemas.microsoft.com/office/infopath/2007/PartnerControls">
+  <documentManagement/>
+</p:properties>
+</file>
+
+<file path=customXml/item3.xml><?xml version="1.0" encoding="utf-8"?>
 <ct:contentTypeSchema xmlns:ct="http://schemas.microsoft.com/office/2006/metadata/contentType" xmlns:ma="http://schemas.microsoft.com/office/2006/metadata/properties/metaAttributes" ct:_="" ma:_="" ma:contentTypeName="Document" ma:contentTypeID="0x0101007188BDCA587B344BBA6CB1A93FAE6998" ma:contentTypeVersion="2" ma:contentTypeDescription="Create a new document." ma:contentTypeScope="" ma:versionID="7a8e4b6720badb2566a0cfeddfaf2856">
   <xsd:schema xmlns:xsd="http://www.w3.org/2001/XMLSchema" xmlns:xs="http://www.w3.org/2001/XMLSchema" xmlns:p="http://schemas.microsoft.com/office/2006/metadata/properties" xmlns:ns2="ba111d12-426d-4af0-bcb6-460e36974645" targetNamespace="http://schemas.microsoft.com/office/2006/metadata/properties" ma:root="true" ma:fieldsID="989b05398519136c88ba0a8d54e3c3da" ns2:_="">
     <xsd:import namespace="ba111d12-426d-4af0-bcb6-460e36974645"/>
@@ -51689,22 +51704,24 @@
 </ct:contentTypeSchema>
 </file>
 
-<file path=customXml/item2.xml><?xml version="1.0" encoding="utf-8"?>
-<?mso-contentType ?>
-<FormTemplates xmlns="http://schemas.microsoft.com/sharepoint/v3/contenttype/forms">
-  <Display>DocumentLibraryForm</Display>
-  <Edit>DocumentLibraryForm</Edit>
-  <New>DocumentLibraryForm</New>
-</FormTemplates>
+<file path=customXml/itemProps1.xml><?xml version="1.0" encoding="utf-8"?>
+<ds:datastoreItem xmlns:ds="http://schemas.openxmlformats.org/officeDocument/2006/customXml" ds:itemID="{B29FA394-C6E8-4B48-9BF0-F38F08DF746F}">
+  <ds:schemaRefs>
+    <ds:schemaRef ds:uri="http://schemas.microsoft.com/sharepoint/v3/contenttype/forms"/>
+  </ds:schemaRefs>
+</ds:datastoreItem>
 </file>
 
-<file path=customXml/item3.xml><?xml version="1.0" encoding="utf-8"?>
-<p:properties xmlns:p="http://schemas.microsoft.com/office/2006/metadata/properties" xmlns:xsi="http://www.w3.org/2001/XMLSchema-instance" xmlns:pc="http://schemas.microsoft.com/office/infopath/2007/PartnerControls">
-  <documentManagement/>
-</p:properties>
+<file path=customXml/itemProps2.xml><?xml version="1.0" encoding="utf-8"?>
+<ds:datastoreItem xmlns:ds="http://schemas.openxmlformats.org/officeDocument/2006/customXml" ds:itemID="{269635E6-5F75-4714-B855-47C05936D03E}">
+  <ds:schemaRefs>
+    <ds:schemaRef ds:uri="http://schemas.microsoft.com/office/2006/metadata/properties"/>
+    <ds:schemaRef ds:uri="http://schemas.microsoft.com/office/infopath/2007/PartnerControls"/>
+  </ds:schemaRefs>
+</ds:datastoreItem>
 </file>
 
-<file path=customXml/itemProps1.xml><?xml version="1.0" encoding="utf-8"?>
+<file path=customXml/itemProps3.xml><?xml version="1.0" encoding="utf-8"?>
 <ds:datastoreItem xmlns:ds="http://schemas.openxmlformats.org/officeDocument/2006/customXml" ds:itemID="{2815333D-9ACC-46B0-9DB0-FDDC64840E6E}">
   <ds:schemaRefs>
     <ds:schemaRef ds:uri="http://schemas.microsoft.com/office/2006/metadata/contentType"/>
@@ -51720,21 +51737,4 @@
     <ds:schemaRef ds:uri="http://schemas.microsoft.com/internal/obd"/>
   </ds:schemaRefs>
 </ds:datastoreItem>
-</file>
-
-<file path=customXml/itemProps2.xml><?xml version="1.0" encoding="utf-8"?>
-<ds:datastoreItem xmlns:ds="http://schemas.openxmlformats.org/officeDocument/2006/customXml" ds:itemID="{B29FA394-C6E8-4B48-9BF0-F38F08DF746F}">
-  <ds:schemaRefs>
-    <ds:schemaRef ds:uri="http://schemas.microsoft.com/sharepoint/v3/contenttype/forms"/>
-  </ds:schemaRefs>
-</ds:datastoreItem>
-</file>
-
-<file path=customXml/itemProps3.xml><?xml version="1.0" encoding="utf-8"?>
-<ds:datastoreItem xmlns:ds="http://schemas.openxmlformats.org/officeDocument/2006/customXml" ds:itemID="{269635E6-5F75-4714-B855-47C05936D03E}">
-  <ds:schemaRefs>
-    <ds:schemaRef ds:uri="http://schemas.microsoft.com/office/2006/metadata/properties"/>
-    <ds:schemaRef ds:uri="http://schemas.microsoft.com/office/infopath/2007/PartnerControls"/>
-  </ds:schemaRefs>
-</ds:datastoreItem>
 </file>
</xml_diff>